<commit_message>
add some images to ppt
</commit_message>
<xml_diff>
--- a/finalDocuments/final_presentation.pptx
+++ b/finalDocuments/final_presentation.pptx
@@ -4658,8 +4658,74 @@
         </p:blipFill>
         <p:spPr>
           <a:xfrm>
-            <a:off x="3412758" y="3429000"/>
+            <a:off x="1026522" y="3447639"/>
             <a:ext cx="5366483" cy="1830253"/>
+          </a:xfrm>
+          <a:prstGeom prst="rect">
+            <a:avLst/>
+          </a:prstGeom>
+        </p:spPr>
+      </p:pic>
+      <p:pic>
+        <p:nvPicPr>
+          <p:cNvPr id="4" name="그림 3">
+            <a:extLst>
+              <a:ext uri="{FF2B5EF4-FFF2-40B4-BE49-F238E27FC236}">
+                <a16:creationId xmlns:a16="http://schemas.microsoft.com/office/drawing/2014/main" id="{D2E8EFA3-C885-4CCD-B6C8-D6A83F35C4B9}"/>
+              </a:ext>
+            </a:extLst>
+          </p:cNvPr>
+          <p:cNvPicPr>
+            <a:picLocks noChangeAspect="1"/>
+          </p:cNvPicPr>
+          <p:nvPr/>
+        </p:nvPicPr>
+        <p:blipFill>
+          <a:blip r:embed="rId3">
+            <a:extLst>
+              <a:ext uri="{28A0092B-C50C-407E-A947-70E740481C1C}">
+                <a14:useLocalDpi xmlns:a14="http://schemas.microsoft.com/office/drawing/2010/main" val="0"/>
+              </a:ext>
+            </a:extLst>
+          </a:blip>
+          <a:stretch>
+            <a:fillRect/>
+          </a:stretch>
+        </p:blipFill>
+        <p:spPr>
+          <a:xfrm>
+            <a:off x="3679552" y="2817398"/>
+            <a:ext cx="7452536" cy="3173956"/>
+          </a:xfrm>
+          <a:prstGeom prst="rect">
+            <a:avLst/>
+          </a:prstGeom>
+        </p:spPr>
+      </p:pic>
+      <p:pic>
+        <p:nvPicPr>
+          <p:cNvPr id="6" name="그림 5">
+            <a:extLst>
+              <a:ext uri="{FF2B5EF4-FFF2-40B4-BE49-F238E27FC236}">
+                <a16:creationId xmlns:a16="http://schemas.microsoft.com/office/drawing/2014/main" id="{5075A931-BE03-4B7E-8F2A-10FD33587DF9}"/>
+              </a:ext>
+            </a:extLst>
+          </p:cNvPr>
+          <p:cNvPicPr>
+            <a:picLocks noChangeAspect="1"/>
+          </p:cNvPicPr>
+          <p:nvPr/>
+        </p:nvPicPr>
+        <p:blipFill>
+          <a:blip r:embed="rId4"/>
+          <a:stretch>
+            <a:fillRect/>
+          </a:stretch>
+        </p:blipFill>
+        <p:spPr>
+          <a:xfrm>
+            <a:off x="876369" y="3376469"/>
+            <a:ext cx="9418677" cy="1901423"/>
           </a:xfrm>
           <a:prstGeom prst="rect">
             <a:avLst/>
@@ -4676,6 +4742,171 @@
   <p:clrMapOvr>
     <a:masterClrMapping/>
   </p:clrMapOvr>
+  <p:timing>
+    <p:tnLst>
+      <p:par>
+        <p:cTn id="1" dur="indefinite" restart="never" nodeType="tmRoot">
+          <p:childTnLst>
+            <p:seq concurrent="1" nextAc="seek">
+              <p:cTn id="2" dur="indefinite" nodeType="mainSeq">
+                <p:childTnLst>
+                  <p:par>
+                    <p:cTn id="3" fill="hold">
+                      <p:stCondLst>
+                        <p:cond delay="indefinite"/>
+                      </p:stCondLst>
+                      <p:childTnLst>
+                        <p:par>
+                          <p:cTn id="4" fill="hold">
+                            <p:stCondLst>
+                              <p:cond delay="0"/>
+                            </p:stCondLst>
+                            <p:childTnLst>
+                              <p:par>
+                                <p:cTn id="5" presetID="1" presetClass="entr" presetSubtype="0" fill="hold" nodeType="clickEffect">
+                                  <p:stCondLst>
+                                    <p:cond delay="0"/>
+                                  </p:stCondLst>
+                                  <p:childTnLst>
+                                    <p:set>
+                                      <p:cBhvr>
+                                        <p:cTn id="6" dur="1" fill="hold">
+                                          <p:stCondLst>
+                                            <p:cond delay="0"/>
+                                          </p:stCondLst>
+                                        </p:cTn>
+                                        <p:tgtEl>
+                                          <p:spTgt spid="5"/>
+                                        </p:tgtEl>
+                                        <p:attrNameLst>
+                                          <p:attrName>style.visibility</p:attrName>
+                                        </p:attrNameLst>
+                                      </p:cBhvr>
+                                      <p:to>
+                                        <p:strVal val="visible"/>
+                                      </p:to>
+                                    </p:set>
+                                  </p:childTnLst>
+                                </p:cTn>
+                              </p:par>
+                            </p:childTnLst>
+                          </p:cTn>
+                        </p:par>
+                      </p:childTnLst>
+                    </p:cTn>
+                  </p:par>
+                  <p:par>
+                    <p:cTn id="7" fill="hold">
+                      <p:stCondLst>
+                        <p:cond delay="indefinite"/>
+                      </p:stCondLst>
+                      <p:childTnLst>
+                        <p:par>
+                          <p:cTn id="8" fill="hold">
+                            <p:stCondLst>
+                              <p:cond delay="0"/>
+                            </p:stCondLst>
+                            <p:childTnLst>
+                              <p:par>
+                                <p:cTn id="9" presetID="1" presetClass="entr" presetSubtype="0" fill="hold" nodeType="clickEffect">
+                                  <p:stCondLst>
+                                    <p:cond delay="0"/>
+                                  </p:stCondLst>
+                                  <p:childTnLst>
+                                    <p:set>
+                                      <p:cBhvr>
+                                        <p:cTn id="10" dur="1" fill="hold">
+                                          <p:stCondLst>
+                                            <p:cond delay="0"/>
+                                          </p:stCondLst>
+                                        </p:cTn>
+                                        <p:tgtEl>
+                                          <p:spTgt spid="4"/>
+                                        </p:tgtEl>
+                                        <p:attrNameLst>
+                                          <p:attrName>style.visibility</p:attrName>
+                                        </p:attrNameLst>
+                                      </p:cBhvr>
+                                      <p:to>
+                                        <p:strVal val="visible"/>
+                                      </p:to>
+                                    </p:set>
+                                  </p:childTnLst>
+                                </p:cTn>
+                              </p:par>
+                            </p:childTnLst>
+                          </p:cTn>
+                        </p:par>
+                      </p:childTnLst>
+                    </p:cTn>
+                  </p:par>
+                  <p:par>
+                    <p:cTn id="11" fill="hold">
+                      <p:stCondLst>
+                        <p:cond delay="indefinite"/>
+                      </p:stCondLst>
+                      <p:childTnLst>
+                        <p:par>
+                          <p:cTn id="12" fill="hold">
+                            <p:stCondLst>
+                              <p:cond delay="0"/>
+                            </p:stCondLst>
+                            <p:childTnLst>
+                              <p:par>
+                                <p:cTn id="13" presetID="1" presetClass="entr" presetSubtype="0" fill="hold" nodeType="clickEffect">
+                                  <p:stCondLst>
+                                    <p:cond delay="0"/>
+                                  </p:stCondLst>
+                                  <p:childTnLst>
+                                    <p:set>
+                                      <p:cBhvr>
+                                        <p:cTn id="14" dur="1" fill="hold">
+                                          <p:stCondLst>
+                                            <p:cond delay="0"/>
+                                          </p:stCondLst>
+                                        </p:cTn>
+                                        <p:tgtEl>
+                                          <p:spTgt spid="6"/>
+                                        </p:tgtEl>
+                                        <p:attrNameLst>
+                                          <p:attrName>style.visibility</p:attrName>
+                                        </p:attrNameLst>
+                                      </p:cBhvr>
+                                      <p:to>
+                                        <p:strVal val="visible"/>
+                                      </p:to>
+                                    </p:set>
+                                  </p:childTnLst>
+                                </p:cTn>
+                              </p:par>
+                            </p:childTnLst>
+                          </p:cTn>
+                        </p:par>
+                      </p:childTnLst>
+                    </p:cTn>
+                  </p:par>
+                </p:childTnLst>
+              </p:cTn>
+              <p:prevCondLst>
+                <p:cond evt="onPrev" delay="0">
+                  <p:tgtEl>
+                    <p:sldTgt/>
+                  </p:tgtEl>
+                </p:cond>
+              </p:prevCondLst>
+              <p:nextCondLst>
+                <p:cond evt="onNext" delay="0">
+                  <p:tgtEl>
+                    <p:sldTgt/>
+                  </p:tgtEl>
+                </p:cond>
+              </p:nextCondLst>
+            </p:seq>
+          </p:childTnLst>
+        </p:cTn>
+      </p:par>
+    </p:tnLst>
+  </p:timing>
 </p:sld>
 </file>
 
@@ -5598,7 +5829,7 @@
         </p:nvSpPr>
         <p:spPr>
           <a:xfrm>
-            <a:off x="1929691" y="4233444"/>
+            <a:off x="1899112" y="4303571"/>
             <a:ext cx="935201" cy="837621"/>
           </a:xfrm>
           <a:prstGeom prst="frame">
@@ -5839,7 +6070,7 @@
         </p:nvSpPr>
         <p:spPr>
           <a:xfrm>
-            <a:off x="7354967" y="4296462"/>
+            <a:off x="7287782" y="4303571"/>
             <a:ext cx="1287781" cy="767494"/>
           </a:xfrm>
           <a:prstGeom prst="frame">
@@ -5894,7 +6125,7 @@
         </p:nvSpPr>
         <p:spPr>
           <a:xfrm>
-            <a:off x="9136470" y="4296462"/>
+            <a:off x="9136470" y="4326311"/>
             <a:ext cx="1287780" cy="767494"/>
           </a:xfrm>
           <a:prstGeom prst="frame">
@@ -5952,7 +6183,7 @@
         </p:nvCxnSpPr>
         <p:spPr>
           <a:xfrm>
-            <a:off x="7998858" y="5063956"/>
+            <a:off x="7931673" y="5071065"/>
             <a:ext cx="0" cy="554966"/>
           </a:xfrm>
           <a:prstGeom prst="straightConnector1">

</xml_diff>

<commit_message>
final changed(some text, ppt)
</commit_message>
<xml_diff>
--- a/finalDocuments/final_presentation.pptx
+++ b/finalDocuments/final_presentation.pptx
@@ -4658,8 +4658,74 @@
         </p:blipFill>
         <p:spPr>
           <a:xfrm>
-            <a:off x="3412758" y="3429000"/>
+            <a:off x="1026522" y="3447639"/>
             <a:ext cx="5366483" cy="1830253"/>
+          </a:xfrm>
+          <a:prstGeom prst="rect">
+            <a:avLst/>
+          </a:prstGeom>
+        </p:spPr>
+      </p:pic>
+      <p:pic>
+        <p:nvPicPr>
+          <p:cNvPr id="4" name="그림 3">
+            <a:extLst>
+              <a:ext uri="{FF2B5EF4-FFF2-40B4-BE49-F238E27FC236}">
+                <a16:creationId xmlns:a16="http://schemas.microsoft.com/office/drawing/2014/main" id="{D2E8EFA3-C885-4CCD-B6C8-D6A83F35C4B9}"/>
+              </a:ext>
+            </a:extLst>
+          </p:cNvPr>
+          <p:cNvPicPr>
+            <a:picLocks noChangeAspect="1"/>
+          </p:cNvPicPr>
+          <p:nvPr/>
+        </p:nvPicPr>
+        <p:blipFill>
+          <a:blip r:embed="rId3">
+            <a:extLst>
+              <a:ext uri="{28A0092B-C50C-407E-A947-70E740481C1C}">
+                <a14:useLocalDpi xmlns:a14="http://schemas.microsoft.com/office/drawing/2010/main" val="0"/>
+              </a:ext>
+            </a:extLst>
+          </a:blip>
+          <a:stretch>
+            <a:fillRect/>
+          </a:stretch>
+        </p:blipFill>
+        <p:spPr>
+          <a:xfrm>
+            <a:off x="3679552" y="2817398"/>
+            <a:ext cx="7452536" cy="3173956"/>
+          </a:xfrm>
+          <a:prstGeom prst="rect">
+            <a:avLst/>
+          </a:prstGeom>
+        </p:spPr>
+      </p:pic>
+      <p:pic>
+        <p:nvPicPr>
+          <p:cNvPr id="6" name="그림 5">
+            <a:extLst>
+              <a:ext uri="{FF2B5EF4-FFF2-40B4-BE49-F238E27FC236}">
+                <a16:creationId xmlns:a16="http://schemas.microsoft.com/office/drawing/2014/main" id="{5075A931-BE03-4B7E-8F2A-10FD33587DF9}"/>
+              </a:ext>
+            </a:extLst>
+          </p:cNvPr>
+          <p:cNvPicPr>
+            <a:picLocks noChangeAspect="1"/>
+          </p:cNvPicPr>
+          <p:nvPr/>
+        </p:nvPicPr>
+        <p:blipFill>
+          <a:blip r:embed="rId4"/>
+          <a:stretch>
+            <a:fillRect/>
+          </a:stretch>
+        </p:blipFill>
+        <p:spPr>
+          <a:xfrm>
+            <a:off x="876369" y="3376469"/>
+            <a:ext cx="9418677" cy="1901423"/>
           </a:xfrm>
           <a:prstGeom prst="rect">
             <a:avLst/>
@@ -4676,6 +4742,171 @@
   <p:clrMapOvr>
     <a:masterClrMapping/>
   </p:clrMapOvr>
+  <p:timing>
+    <p:tnLst>
+      <p:par>
+        <p:cTn id="1" dur="indefinite" restart="never" nodeType="tmRoot">
+          <p:childTnLst>
+            <p:seq concurrent="1" nextAc="seek">
+              <p:cTn id="2" dur="indefinite" nodeType="mainSeq">
+                <p:childTnLst>
+                  <p:par>
+                    <p:cTn id="3" fill="hold">
+                      <p:stCondLst>
+                        <p:cond delay="indefinite"/>
+                      </p:stCondLst>
+                      <p:childTnLst>
+                        <p:par>
+                          <p:cTn id="4" fill="hold">
+                            <p:stCondLst>
+                              <p:cond delay="0"/>
+                            </p:stCondLst>
+                            <p:childTnLst>
+                              <p:par>
+                                <p:cTn id="5" presetID="1" presetClass="entr" presetSubtype="0" fill="hold" nodeType="clickEffect">
+                                  <p:stCondLst>
+                                    <p:cond delay="0"/>
+                                  </p:stCondLst>
+                                  <p:childTnLst>
+                                    <p:set>
+                                      <p:cBhvr>
+                                        <p:cTn id="6" dur="1" fill="hold">
+                                          <p:stCondLst>
+                                            <p:cond delay="0"/>
+                                          </p:stCondLst>
+                                        </p:cTn>
+                                        <p:tgtEl>
+                                          <p:spTgt spid="5"/>
+                                        </p:tgtEl>
+                                        <p:attrNameLst>
+                                          <p:attrName>style.visibility</p:attrName>
+                                        </p:attrNameLst>
+                                      </p:cBhvr>
+                                      <p:to>
+                                        <p:strVal val="visible"/>
+                                      </p:to>
+                                    </p:set>
+                                  </p:childTnLst>
+                                </p:cTn>
+                              </p:par>
+                            </p:childTnLst>
+                          </p:cTn>
+                        </p:par>
+                      </p:childTnLst>
+                    </p:cTn>
+                  </p:par>
+                  <p:par>
+                    <p:cTn id="7" fill="hold">
+                      <p:stCondLst>
+                        <p:cond delay="indefinite"/>
+                      </p:stCondLst>
+                      <p:childTnLst>
+                        <p:par>
+                          <p:cTn id="8" fill="hold">
+                            <p:stCondLst>
+                              <p:cond delay="0"/>
+                            </p:stCondLst>
+                            <p:childTnLst>
+                              <p:par>
+                                <p:cTn id="9" presetID="1" presetClass="entr" presetSubtype="0" fill="hold" nodeType="clickEffect">
+                                  <p:stCondLst>
+                                    <p:cond delay="0"/>
+                                  </p:stCondLst>
+                                  <p:childTnLst>
+                                    <p:set>
+                                      <p:cBhvr>
+                                        <p:cTn id="10" dur="1" fill="hold">
+                                          <p:stCondLst>
+                                            <p:cond delay="0"/>
+                                          </p:stCondLst>
+                                        </p:cTn>
+                                        <p:tgtEl>
+                                          <p:spTgt spid="4"/>
+                                        </p:tgtEl>
+                                        <p:attrNameLst>
+                                          <p:attrName>style.visibility</p:attrName>
+                                        </p:attrNameLst>
+                                      </p:cBhvr>
+                                      <p:to>
+                                        <p:strVal val="visible"/>
+                                      </p:to>
+                                    </p:set>
+                                  </p:childTnLst>
+                                </p:cTn>
+                              </p:par>
+                            </p:childTnLst>
+                          </p:cTn>
+                        </p:par>
+                      </p:childTnLst>
+                    </p:cTn>
+                  </p:par>
+                  <p:par>
+                    <p:cTn id="11" fill="hold">
+                      <p:stCondLst>
+                        <p:cond delay="indefinite"/>
+                      </p:stCondLst>
+                      <p:childTnLst>
+                        <p:par>
+                          <p:cTn id="12" fill="hold">
+                            <p:stCondLst>
+                              <p:cond delay="0"/>
+                            </p:stCondLst>
+                            <p:childTnLst>
+                              <p:par>
+                                <p:cTn id="13" presetID="1" presetClass="entr" presetSubtype="0" fill="hold" nodeType="clickEffect">
+                                  <p:stCondLst>
+                                    <p:cond delay="0"/>
+                                  </p:stCondLst>
+                                  <p:childTnLst>
+                                    <p:set>
+                                      <p:cBhvr>
+                                        <p:cTn id="14" dur="1" fill="hold">
+                                          <p:stCondLst>
+                                            <p:cond delay="0"/>
+                                          </p:stCondLst>
+                                        </p:cTn>
+                                        <p:tgtEl>
+                                          <p:spTgt spid="6"/>
+                                        </p:tgtEl>
+                                        <p:attrNameLst>
+                                          <p:attrName>style.visibility</p:attrName>
+                                        </p:attrNameLst>
+                                      </p:cBhvr>
+                                      <p:to>
+                                        <p:strVal val="visible"/>
+                                      </p:to>
+                                    </p:set>
+                                  </p:childTnLst>
+                                </p:cTn>
+                              </p:par>
+                            </p:childTnLst>
+                          </p:cTn>
+                        </p:par>
+                      </p:childTnLst>
+                    </p:cTn>
+                  </p:par>
+                </p:childTnLst>
+              </p:cTn>
+              <p:prevCondLst>
+                <p:cond evt="onPrev" delay="0">
+                  <p:tgtEl>
+                    <p:sldTgt/>
+                  </p:tgtEl>
+                </p:cond>
+              </p:prevCondLst>
+              <p:nextCondLst>
+                <p:cond evt="onNext" delay="0">
+                  <p:tgtEl>
+                    <p:sldTgt/>
+                  </p:tgtEl>
+                </p:cond>
+              </p:nextCondLst>
+            </p:seq>
+          </p:childTnLst>
+        </p:cTn>
+      </p:par>
+    </p:tnLst>
+  </p:timing>
 </p:sld>
 </file>
 
@@ -5144,7 +5375,7 @@
                             </p:stCondLst>
                             <p:childTnLst>
                               <p:par>
-                                <p:cTn id="5" presetID="1" presetClass="entr" presetSubtype="0" fill="hold" nodeType="clickEffect">
+                                <p:cTn id="5" presetID="1" presetClass="entr" presetSubtype="0" fill="hold" grpId="0" nodeType="clickEffect">
                                   <p:stCondLst>
                                     <p:cond delay="0"/>
                                   </p:stCondLst>
@@ -5157,7 +5388,7 @@
                                           </p:stCondLst>
                                         </p:cTn>
                                         <p:tgtEl>
-                                          <p:spTgt spid="4"/>
+                                          <p:spTgt spid="9"/>
                                         </p:tgtEl>
                                         <p:attrNameLst>
                                           <p:attrName>style.visibility</p:attrName>
@@ -5202,96 +5433,6 @@
                                           </p:stCondLst>
                                         </p:cTn>
                                         <p:tgtEl>
-                                          <p:spTgt spid="5"/>
-                                        </p:tgtEl>
-                                        <p:attrNameLst>
-                                          <p:attrName>style.visibility</p:attrName>
-                                        </p:attrNameLst>
-                                      </p:cBhvr>
-                                      <p:to>
-                                        <p:strVal val="visible"/>
-                                      </p:to>
-                                    </p:set>
-                                  </p:childTnLst>
-                                </p:cTn>
-                              </p:par>
-                            </p:childTnLst>
-                          </p:cTn>
-                        </p:par>
-                      </p:childTnLst>
-                    </p:cTn>
-                  </p:par>
-                  <p:par>
-                    <p:cTn id="11" fill="hold">
-                      <p:stCondLst>
-                        <p:cond delay="indefinite"/>
-                      </p:stCondLst>
-                      <p:childTnLst>
-                        <p:par>
-                          <p:cTn id="12" fill="hold">
-                            <p:stCondLst>
-                              <p:cond delay="0"/>
-                            </p:stCondLst>
-                            <p:childTnLst>
-                              <p:par>
-                                <p:cTn id="13" presetID="1" presetClass="entr" presetSubtype="0" fill="hold" grpId="0" nodeType="clickEffect">
-                                  <p:stCondLst>
-                                    <p:cond delay="0"/>
-                                  </p:stCondLst>
-                                  <p:childTnLst>
-                                    <p:set>
-                                      <p:cBhvr>
-                                        <p:cTn id="14" dur="1" fill="hold">
-                                          <p:stCondLst>
-                                            <p:cond delay="0"/>
-                                          </p:stCondLst>
-                                        </p:cTn>
-                                        <p:tgtEl>
-                                          <p:spTgt spid="9"/>
-                                        </p:tgtEl>
-                                        <p:attrNameLst>
-                                          <p:attrName>style.visibility</p:attrName>
-                                        </p:attrNameLst>
-                                      </p:cBhvr>
-                                      <p:to>
-                                        <p:strVal val="visible"/>
-                                      </p:to>
-                                    </p:set>
-                                  </p:childTnLst>
-                                </p:cTn>
-                              </p:par>
-                            </p:childTnLst>
-                          </p:cTn>
-                        </p:par>
-                      </p:childTnLst>
-                    </p:cTn>
-                  </p:par>
-                  <p:par>
-                    <p:cTn id="15" fill="hold">
-                      <p:stCondLst>
-                        <p:cond delay="indefinite"/>
-                      </p:stCondLst>
-                      <p:childTnLst>
-                        <p:par>
-                          <p:cTn id="16" fill="hold">
-                            <p:stCondLst>
-                              <p:cond delay="0"/>
-                            </p:stCondLst>
-                            <p:childTnLst>
-                              <p:par>
-                                <p:cTn id="17" presetID="1" presetClass="entr" presetSubtype="0" fill="hold" nodeType="clickEffect">
-                                  <p:stCondLst>
-                                    <p:cond delay="0"/>
-                                  </p:stCondLst>
-                                  <p:childTnLst>
-                                    <p:set>
-                                      <p:cBhvr>
-                                        <p:cTn id="18" dur="1" fill="hold">
-                                          <p:stCondLst>
-                                            <p:cond delay="0"/>
-                                          </p:stCondLst>
-                                        </p:cTn>
-                                        <p:tgtEl>
                                           <p:spTgt spid="7"/>
                                         </p:tgtEl>
                                         <p:attrNameLst>
@@ -5306,14 +5447,14 @@
                                 </p:cTn>
                               </p:par>
                               <p:par>
-                                <p:cTn id="19" presetID="1" presetClass="entr" presetSubtype="0" fill="hold" grpId="0" nodeType="withEffect">
+                                <p:cTn id="11" presetID="1" presetClass="entr" presetSubtype="0" fill="hold" grpId="0" nodeType="withEffect">
                                   <p:stCondLst>
                                     <p:cond delay="0"/>
                                   </p:stCondLst>
                                   <p:childTnLst>
                                     <p:set>
                                       <p:cBhvr>
-                                        <p:cTn id="20" dur="1" fill="hold">
+                                        <p:cTn id="12" dur="1" fill="hold">
                                           <p:stCondLst>
                                             <p:cond delay="0"/>
                                           </p:stCondLst>
@@ -5598,7 +5739,7 @@
         </p:nvSpPr>
         <p:spPr>
           <a:xfrm>
-            <a:off x="1929691" y="4233444"/>
+            <a:off x="1899112" y="4303571"/>
             <a:ext cx="935201" cy="837621"/>
           </a:xfrm>
           <a:prstGeom prst="frame">
@@ -5839,7 +5980,7 @@
         </p:nvSpPr>
         <p:spPr>
           <a:xfrm>
-            <a:off x="7354967" y="4296462"/>
+            <a:off x="7287782" y="4303571"/>
             <a:ext cx="1287781" cy="767494"/>
           </a:xfrm>
           <a:prstGeom prst="frame">
@@ -5894,7 +6035,7 @@
         </p:nvSpPr>
         <p:spPr>
           <a:xfrm>
-            <a:off x="9136470" y="4296462"/>
+            <a:off x="9136470" y="4326311"/>
             <a:ext cx="1287780" cy="767494"/>
           </a:xfrm>
           <a:prstGeom prst="frame">
@@ -5952,7 +6093,7 @@
         </p:nvCxnSpPr>
         <p:spPr>
           <a:xfrm>
-            <a:off x="7998858" y="5063956"/>
+            <a:off x="7931673" y="5071065"/>
             <a:ext cx="0" cy="554966"/>
           </a:xfrm>
           <a:prstGeom prst="straightConnector1">
@@ -6142,450 +6283,6 @@
   <p:clrMapOvr>
     <a:masterClrMapping/>
   </p:clrMapOvr>
-  <p:timing>
-    <p:tnLst>
-      <p:par>
-        <p:cTn id="1" dur="indefinite" restart="never" nodeType="tmRoot">
-          <p:childTnLst>
-            <p:seq concurrent="1" nextAc="seek">
-              <p:cTn id="2" dur="indefinite" nodeType="mainSeq">
-                <p:childTnLst>
-                  <p:par>
-                    <p:cTn id="3" fill="hold">
-                      <p:stCondLst>
-                        <p:cond delay="indefinite"/>
-                      </p:stCondLst>
-                      <p:childTnLst>
-                        <p:par>
-                          <p:cTn id="4" fill="hold">
-                            <p:stCondLst>
-                              <p:cond delay="0"/>
-                            </p:stCondLst>
-                            <p:childTnLst>
-                              <p:par>
-                                <p:cTn id="5" presetID="1" presetClass="entr" presetSubtype="0" fill="hold" grpId="0" nodeType="clickEffect">
-                                  <p:stCondLst>
-                                    <p:cond delay="0"/>
-                                  </p:stCondLst>
-                                  <p:childTnLst>
-                                    <p:set>
-                                      <p:cBhvr>
-                                        <p:cTn id="6" dur="1" fill="hold">
-                                          <p:stCondLst>
-                                            <p:cond delay="0"/>
-                                          </p:stCondLst>
-                                        </p:cTn>
-                                        <p:tgtEl>
-                                          <p:spTgt spid="8"/>
-                                        </p:tgtEl>
-                                        <p:attrNameLst>
-                                          <p:attrName>style.visibility</p:attrName>
-                                        </p:attrNameLst>
-                                      </p:cBhvr>
-                                      <p:to>
-                                        <p:strVal val="visible"/>
-                                      </p:to>
-                                    </p:set>
-                                  </p:childTnLst>
-                                </p:cTn>
-                              </p:par>
-                            </p:childTnLst>
-                          </p:cTn>
-                        </p:par>
-                      </p:childTnLst>
-                    </p:cTn>
-                  </p:par>
-                  <p:par>
-                    <p:cTn id="7" fill="hold">
-                      <p:stCondLst>
-                        <p:cond delay="indefinite"/>
-                      </p:stCondLst>
-                      <p:childTnLst>
-                        <p:par>
-                          <p:cTn id="8" fill="hold">
-                            <p:stCondLst>
-                              <p:cond delay="0"/>
-                            </p:stCondLst>
-                            <p:childTnLst>
-                              <p:par>
-                                <p:cTn id="9" presetID="1" presetClass="entr" presetSubtype="0" fill="hold" grpId="0" nodeType="clickEffect">
-                                  <p:stCondLst>
-                                    <p:cond delay="0"/>
-                                  </p:stCondLst>
-                                  <p:childTnLst>
-                                    <p:set>
-                                      <p:cBhvr>
-                                        <p:cTn id="10" dur="1" fill="hold">
-                                          <p:stCondLst>
-                                            <p:cond delay="0"/>
-                                          </p:stCondLst>
-                                        </p:cTn>
-                                        <p:tgtEl>
-                                          <p:spTgt spid="15"/>
-                                        </p:tgtEl>
-                                        <p:attrNameLst>
-                                          <p:attrName>style.visibility</p:attrName>
-                                        </p:attrNameLst>
-                                      </p:cBhvr>
-                                      <p:to>
-                                        <p:strVal val="visible"/>
-                                      </p:to>
-                                    </p:set>
-                                  </p:childTnLst>
-                                </p:cTn>
-                              </p:par>
-                            </p:childTnLst>
-                          </p:cTn>
-                        </p:par>
-                      </p:childTnLst>
-                    </p:cTn>
-                  </p:par>
-                  <p:par>
-                    <p:cTn id="11" fill="hold">
-                      <p:stCondLst>
-                        <p:cond delay="indefinite"/>
-                      </p:stCondLst>
-                      <p:childTnLst>
-                        <p:par>
-                          <p:cTn id="12" fill="hold">
-                            <p:stCondLst>
-                              <p:cond delay="0"/>
-                            </p:stCondLst>
-                            <p:childTnLst>
-                              <p:par>
-                                <p:cTn id="13" presetID="1" presetClass="entr" presetSubtype="0" fill="hold" grpId="0" nodeType="clickEffect">
-                                  <p:stCondLst>
-                                    <p:cond delay="0"/>
-                                  </p:stCondLst>
-                                  <p:childTnLst>
-                                    <p:set>
-                                      <p:cBhvr>
-                                        <p:cTn id="14" dur="1" fill="hold">
-                                          <p:stCondLst>
-                                            <p:cond delay="0"/>
-                                          </p:stCondLst>
-                                        </p:cTn>
-                                        <p:tgtEl>
-                                          <p:spTgt spid="16"/>
-                                        </p:tgtEl>
-                                        <p:attrNameLst>
-                                          <p:attrName>style.visibility</p:attrName>
-                                        </p:attrNameLst>
-                                      </p:cBhvr>
-                                      <p:to>
-                                        <p:strVal val="visible"/>
-                                      </p:to>
-                                    </p:set>
-                                  </p:childTnLst>
-                                </p:cTn>
-                              </p:par>
-                            </p:childTnLst>
-                          </p:cTn>
-                        </p:par>
-                      </p:childTnLst>
-                    </p:cTn>
-                  </p:par>
-                  <p:par>
-                    <p:cTn id="15" fill="hold">
-                      <p:stCondLst>
-                        <p:cond delay="indefinite"/>
-                      </p:stCondLst>
-                      <p:childTnLst>
-                        <p:par>
-                          <p:cTn id="16" fill="hold">
-                            <p:stCondLst>
-                              <p:cond delay="0"/>
-                            </p:stCondLst>
-                            <p:childTnLst>
-                              <p:par>
-                                <p:cTn id="17" presetID="1" presetClass="entr" presetSubtype="0" fill="hold" nodeType="clickEffect">
-                                  <p:stCondLst>
-                                    <p:cond delay="0"/>
-                                  </p:stCondLst>
-                                  <p:childTnLst>
-                                    <p:set>
-                                      <p:cBhvr>
-                                        <p:cTn id="18" dur="1" fill="hold">
-                                          <p:stCondLst>
-                                            <p:cond delay="0"/>
-                                          </p:stCondLst>
-                                        </p:cTn>
-                                        <p:tgtEl>
-                                          <p:spTgt spid="4"/>
-                                        </p:tgtEl>
-                                        <p:attrNameLst>
-                                          <p:attrName>style.visibility</p:attrName>
-                                        </p:attrNameLst>
-                                      </p:cBhvr>
-                                      <p:to>
-                                        <p:strVal val="visible"/>
-                                      </p:to>
-                                    </p:set>
-                                  </p:childTnLst>
-                                </p:cTn>
-                              </p:par>
-                            </p:childTnLst>
-                          </p:cTn>
-                        </p:par>
-                      </p:childTnLst>
-                    </p:cTn>
-                  </p:par>
-                  <p:par>
-                    <p:cTn id="19" fill="hold">
-                      <p:stCondLst>
-                        <p:cond delay="indefinite"/>
-                      </p:stCondLst>
-                      <p:childTnLst>
-                        <p:par>
-                          <p:cTn id="20" fill="hold">
-                            <p:stCondLst>
-                              <p:cond delay="0"/>
-                            </p:stCondLst>
-                            <p:childTnLst>
-                              <p:par>
-                                <p:cTn id="21" presetID="1" presetClass="entr" presetSubtype="0" fill="hold" grpId="0" nodeType="clickEffect">
-                                  <p:stCondLst>
-                                    <p:cond delay="0"/>
-                                  </p:stCondLst>
-                                  <p:childTnLst>
-                                    <p:set>
-                                      <p:cBhvr>
-                                        <p:cTn id="22" dur="1" fill="hold">
-                                          <p:stCondLst>
-                                            <p:cond delay="0"/>
-                                          </p:stCondLst>
-                                        </p:cTn>
-                                        <p:tgtEl>
-                                          <p:spTgt spid="24"/>
-                                        </p:tgtEl>
-                                        <p:attrNameLst>
-                                          <p:attrName>style.visibility</p:attrName>
-                                        </p:attrNameLst>
-                                      </p:cBhvr>
-                                      <p:to>
-                                        <p:strVal val="visible"/>
-                                      </p:to>
-                                    </p:set>
-                                  </p:childTnLst>
-                                </p:cTn>
-                              </p:par>
-                            </p:childTnLst>
-                          </p:cTn>
-                        </p:par>
-                      </p:childTnLst>
-                    </p:cTn>
-                  </p:par>
-                  <p:par>
-                    <p:cTn id="23" fill="hold">
-                      <p:stCondLst>
-                        <p:cond delay="indefinite"/>
-                      </p:stCondLst>
-                      <p:childTnLst>
-                        <p:par>
-                          <p:cTn id="24" fill="hold">
-                            <p:stCondLst>
-                              <p:cond delay="0"/>
-                            </p:stCondLst>
-                            <p:childTnLst>
-                              <p:par>
-                                <p:cTn id="25" presetID="1" presetClass="entr" presetSubtype="0" fill="hold" grpId="0" nodeType="clickEffect">
-                                  <p:stCondLst>
-                                    <p:cond delay="0"/>
-                                  </p:stCondLst>
-                                  <p:childTnLst>
-                                    <p:set>
-                                      <p:cBhvr>
-                                        <p:cTn id="26" dur="1" fill="hold">
-                                          <p:stCondLst>
-                                            <p:cond delay="0"/>
-                                          </p:stCondLst>
-                                        </p:cTn>
-                                        <p:tgtEl>
-                                          <p:spTgt spid="17"/>
-                                        </p:tgtEl>
-                                        <p:attrNameLst>
-                                          <p:attrName>style.visibility</p:attrName>
-                                        </p:attrNameLst>
-                                      </p:cBhvr>
-                                      <p:to>
-                                        <p:strVal val="visible"/>
-                                      </p:to>
-                                    </p:set>
-                                  </p:childTnLst>
-                                </p:cTn>
-                              </p:par>
-                            </p:childTnLst>
-                          </p:cTn>
-                        </p:par>
-                      </p:childTnLst>
-                    </p:cTn>
-                  </p:par>
-                  <p:par>
-                    <p:cTn id="27" fill="hold">
-                      <p:stCondLst>
-                        <p:cond delay="indefinite"/>
-                      </p:stCondLst>
-                      <p:childTnLst>
-                        <p:par>
-                          <p:cTn id="28" fill="hold">
-                            <p:stCondLst>
-                              <p:cond delay="0"/>
-                            </p:stCondLst>
-                            <p:childTnLst>
-                              <p:par>
-                                <p:cTn id="29" presetID="1" presetClass="entr" presetSubtype="0" fill="hold" nodeType="clickEffect">
-                                  <p:stCondLst>
-                                    <p:cond delay="0"/>
-                                  </p:stCondLst>
-                                  <p:childTnLst>
-                                    <p:set>
-                                      <p:cBhvr>
-                                        <p:cTn id="30" dur="1" fill="hold">
-                                          <p:stCondLst>
-                                            <p:cond delay="0"/>
-                                          </p:stCondLst>
-                                        </p:cTn>
-                                        <p:tgtEl>
-                                          <p:spTgt spid="23"/>
-                                        </p:tgtEl>
-                                        <p:attrNameLst>
-                                          <p:attrName>style.visibility</p:attrName>
-                                        </p:attrNameLst>
-                                      </p:cBhvr>
-                                      <p:to>
-                                        <p:strVal val="visible"/>
-                                      </p:to>
-                                    </p:set>
-                                  </p:childTnLst>
-                                </p:cTn>
-                              </p:par>
-                            </p:childTnLst>
-                          </p:cTn>
-                        </p:par>
-                      </p:childTnLst>
-                    </p:cTn>
-                  </p:par>
-                  <p:par>
-                    <p:cTn id="31" fill="hold">
-                      <p:stCondLst>
-                        <p:cond delay="indefinite"/>
-                      </p:stCondLst>
-                      <p:childTnLst>
-                        <p:par>
-                          <p:cTn id="32" fill="hold">
-                            <p:stCondLst>
-                              <p:cond delay="0"/>
-                            </p:stCondLst>
-                            <p:childTnLst>
-                              <p:par>
-                                <p:cTn id="33" presetID="1" presetClass="entr" presetSubtype="0" fill="hold" grpId="0" nodeType="clickEffect">
-                                  <p:stCondLst>
-                                    <p:cond delay="0"/>
-                                  </p:stCondLst>
-                                  <p:childTnLst>
-                                    <p:set>
-                                      <p:cBhvr>
-                                        <p:cTn id="34" dur="1" fill="hold">
-                                          <p:stCondLst>
-                                            <p:cond delay="0"/>
-                                          </p:stCondLst>
-                                        </p:cTn>
-                                        <p:tgtEl>
-                                          <p:spTgt spid="25"/>
-                                        </p:tgtEl>
-                                        <p:attrNameLst>
-                                          <p:attrName>style.visibility</p:attrName>
-                                        </p:attrNameLst>
-                                      </p:cBhvr>
-                                      <p:to>
-                                        <p:strVal val="visible"/>
-                                      </p:to>
-                                    </p:set>
-                                  </p:childTnLst>
-                                </p:cTn>
-                              </p:par>
-                            </p:childTnLst>
-                          </p:cTn>
-                        </p:par>
-                      </p:childTnLst>
-                    </p:cTn>
-                  </p:par>
-                  <p:par>
-                    <p:cTn id="35" fill="hold">
-                      <p:stCondLst>
-                        <p:cond delay="indefinite"/>
-                      </p:stCondLst>
-                      <p:childTnLst>
-                        <p:par>
-                          <p:cTn id="36" fill="hold">
-                            <p:stCondLst>
-                              <p:cond delay="0"/>
-                            </p:stCondLst>
-                            <p:childTnLst>
-                              <p:par>
-                                <p:cTn id="37" presetID="1" presetClass="entr" presetSubtype="0" fill="hold" grpId="0" nodeType="clickEffect">
-                                  <p:stCondLst>
-                                    <p:cond delay="0"/>
-                                  </p:stCondLst>
-                                  <p:childTnLst>
-                                    <p:set>
-                                      <p:cBhvr>
-                                        <p:cTn id="38" dur="1" fill="hold">
-                                          <p:stCondLst>
-                                            <p:cond delay="0"/>
-                                          </p:stCondLst>
-                                        </p:cTn>
-                                        <p:tgtEl>
-                                          <p:spTgt spid="19"/>
-                                        </p:tgtEl>
-                                        <p:attrNameLst>
-                                          <p:attrName>style.visibility</p:attrName>
-                                        </p:attrNameLst>
-                                      </p:cBhvr>
-                                      <p:to>
-                                        <p:strVal val="visible"/>
-                                      </p:to>
-                                    </p:set>
-                                  </p:childTnLst>
-                                </p:cTn>
-                              </p:par>
-                            </p:childTnLst>
-                          </p:cTn>
-                        </p:par>
-                      </p:childTnLst>
-                    </p:cTn>
-                  </p:par>
-                </p:childTnLst>
-              </p:cTn>
-              <p:prevCondLst>
-                <p:cond evt="onPrev" delay="0">
-                  <p:tgtEl>
-                    <p:sldTgt/>
-                  </p:tgtEl>
-                </p:cond>
-              </p:prevCondLst>
-              <p:nextCondLst>
-                <p:cond evt="onNext" delay="0">
-                  <p:tgtEl>
-                    <p:sldTgt/>
-                  </p:tgtEl>
-                </p:cond>
-              </p:nextCondLst>
-            </p:seq>
-          </p:childTnLst>
-        </p:cTn>
-      </p:par>
-    </p:tnLst>
-    <p:bldLst>
-      <p:bldP spid="8" grpId="0" animBg="1"/>
-      <p:bldP spid="15" grpId="0" animBg="1"/>
-      <p:bldP spid="16" grpId="0" animBg="1"/>
-      <p:bldP spid="17" grpId="0" animBg="1"/>
-      <p:bldP spid="19" grpId="0" animBg="1"/>
-      <p:bldP spid="25" grpId="0"/>
-      <p:bldP spid="24" grpId="0"/>
-    </p:bldLst>
-  </p:timing>
 </p:sld>
 </file>
 
@@ -6894,171 +6591,6 @@
   <p:clrMapOvr>
     <a:masterClrMapping/>
   </p:clrMapOvr>
-  <p:timing>
-    <p:tnLst>
-      <p:par>
-        <p:cTn id="1" dur="indefinite" restart="never" nodeType="tmRoot">
-          <p:childTnLst>
-            <p:seq concurrent="1" nextAc="seek">
-              <p:cTn id="2" dur="indefinite" nodeType="mainSeq">
-                <p:childTnLst>
-                  <p:par>
-                    <p:cTn id="3" fill="hold">
-                      <p:stCondLst>
-                        <p:cond delay="indefinite"/>
-                      </p:stCondLst>
-                      <p:childTnLst>
-                        <p:par>
-                          <p:cTn id="4" fill="hold">
-                            <p:stCondLst>
-                              <p:cond delay="0"/>
-                            </p:stCondLst>
-                            <p:childTnLst>
-                              <p:par>
-                                <p:cTn id="5" presetID="1" presetClass="entr" presetSubtype="0" fill="hold" nodeType="clickEffect">
-                                  <p:stCondLst>
-                                    <p:cond delay="0"/>
-                                  </p:stCondLst>
-                                  <p:childTnLst>
-                                    <p:set>
-                                      <p:cBhvr>
-                                        <p:cTn id="6" dur="1" fill="hold">
-                                          <p:stCondLst>
-                                            <p:cond delay="0"/>
-                                          </p:stCondLst>
-                                        </p:cTn>
-                                        <p:tgtEl>
-                                          <p:spTgt spid="6"/>
-                                        </p:tgtEl>
-                                        <p:attrNameLst>
-                                          <p:attrName>style.visibility</p:attrName>
-                                        </p:attrNameLst>
-                                      </p:cBhvr>
-                                      <p:to>
-                                        <p:strVal val="visible"/>
-                                      </p:to>
-                                    </p:set>
-                                  </p:childTnLst>
-                                </p:cTn>
-                              </p:par>
-                            </p:childTnLst>
-                          </p:cTn>
-                        </p:par>
-                      </p:childTnLst>
-                    </p:cTn>
-                  </p:par>
-                  <p:par>
-                    <p:cTn id="7" fill="hold">
-                      <p:stCondLst>
-                        <p:cond delay="indefinite"/>
-                      </p:stCondLst>
-                      <p:childTnLst>
-                        <p:par>
-                          <p:cTn id="8" fill="hold">
-                            <p:stCondLst>
-                              <p:cond delay="0"/>
-                            </p:stCondLst>
-                            <p:childTnLst>
-                              <p:par>
-                                <p:cTn id="9" presetID="1" presetClass="entr" presetSubtype="0" fill="hold" nodeType="clickEffect">
-                                  <p:stCondLst>
-                                    <p:cond delay="0"/>
-                                  </p:stCondLst>
-                                  <p:childTnLst>
-                                    <p:set>
-                                      <p:cBhvr>
-                                        <p:cTn id="10" dur="1" fill="hold">
-                                          <p:stCondLst>
-                                            <p:cond delay="0"/>
-                                          </p:stCondLst>
-                                        </p:cTn>
-                                        <p:tgtEl>
-                                          <p:spTgt spid="4"/>
-                                        </p:tgtEl>
-                                        <p:attrNameLst>
-                                          <p:attrName>style.visibility</p:attrName>
-                                        </p:attrNameLst>
-                                      </p:cBhvr>
-                                      <p:to>
-                                        <p:strVal val="visible"/>
-                                      </p:to>
-                                    </p:set>
-                                  </p:childTnLst>
-                                </p:cTn>
-                              </p:par>
-                            </p:childTnLst>
-                          </p:cTn>
-                        </p:par>
-                      </p:childTnLst>
-                    </p:cTn>
-                  </p:par>
-                  <p:par>
-                    <p:cTn id="11" fill="hold">
-                      <p:stCondLst>
-                        <p:cond delay="indefinite"/>
-                      </p:stCondLst>
-                      <p:childTnLst>
-                        <p:par>
-                          <p:cTn id="12" fill="hold">
-                            <p:stCondLst>
-                              <p:cond delay="0"/>
-                            </p:stCondLst>
-                            <p:childTnLst>
-                              <p:par>
-                                <p:cTn id="13" presetID="1" presetClass="entr" presetSubtype="0" fill="hold" nodeType="clickEffect">
-                                  <p:stCondLst>
-                                    <p:cond delay="0"/>
-                                  </p:stCondLst>
-                                  <p:childTnLst>
-                                    <p:set>
-                                      <p:cBhvr>
-                                        <p:cTn id="14" dur="1" fill="hold">
-                                          <p:stCondLst>
-                                            <p:cond delay="0"/>
-                                          </p:stCondLst>
-                                        </p:cTn>
-                                        <p:tgtEl>
-                                          <p:spTgt spid="8"/>
-                                        </p:tgtEl>
-                                        <p:attrNameLst>
-                                          <p:attrName>style.visibility</p:attrName>
-                                        </p:attrNameLst>
-                                      </p:cBhvr>
-                                      <p:to>
-                                        <p:strVal val="visible"/>
-                                      </p:to>
-                                    </p:set>
-                                  </p:childTnLst>
-                                </p:cTn>
-                              </p:par>
-                            </p:childTnLst>
-                          </p:cTn>
-                        </p:par>
-                      </p:childTnLst>
-                    </p:cTn>
-                  </p:par>
-                </p:childTnLst>
-              </p:cTn>
-              <p:prevCondLst>
-                <p:cond evt="onPrev" delay="0">
-                  <p:tgtEl>
-                    <p:sldTgt/>
-                  </p:tgtEl>
-                </p:cond>
-              </p:prevCondLst>
-              <p:nextCondLst>
-                <p:cond evt="onNext" delay="0">
-                  <p:tgtEl>
-                    <p:sldTgt/>
-                  </p:tgtEl>
-                </p:cond>
-              </p:nextCondLst>
-            </p:seq>
-          </p:childTnLst>
-        </p:cTn>
-      </p:par>
-    </p:tnLst>
-  </p:timing>
 </p:sld>
 </file>
 
@@ -7249,8 +6781,8 @@
         </p:nvSpPr>
         <p:spPr>
           <a:xfrm>
-            <a:off x="3506252" y="1580108"/>
-            <a:ext cx="5179495" cy="646331"/>
+            <a:off x="3399651" y="1580107"/>
+            <a:ext cx="5392695" cy="646331"/>
           </a:xfrm>
           <a:prstGeom prst="rect">
             <a:avLst/>
@@ -7269,7 +6801,7 @@
                   <a:srgbClr val="7A788D"/>
                 </a:solidFill>
               </a:rPr>
-              <a:t>Bug 0, Coverage 100%</a:t>
+              <a:t>Bugs 0, Coverage 100%</a:t>
             </a:r>
             <a:endParaRPr lang="ko-KR" altLang="en-US" sz="3600" b="1" dirty="0">
               <a:solidFill>
@@ -7403,8 +6935,8 @@
         </p:nvSpPr>
         <p:spPr>
           <a:xfrm>
-            <a:off x="4566125" y="2235993"/>
-            <a:ext cx="3059748" cy="400110"/>
+            <a:off x="4280630" y="2235993"/>
+            <a:ext cx="3640356" cy="400110"/>
           </a:xfrm>
           <a:prstGeom prst="rect">
             <a:avLst/>
@@ -7418,12 +6950,12 @@
           <a:lstStyle/>
           <a:p>
             <a:r>
-              <a:rPr lang="en-US" altLang="ko-KR" sz="2000" b="1" dirty="0" err="1">
+              <a:rPr lang="en-US" altLang="ko-KR" sz="2000" b="1" dirty="0">
                 <a:solidFill>
                   <a:srgbClr val="7A788D"/>
                 </a:solidFill>
               </a:rPr>
-              <a:t>intelliJ</a:t>
+              <a:t>IntelliJ</a:t>
             </a:r>
             <a:r>
               <a:rPr lang="ko-KR" altLang="en-US" sz="2000" b="1" dirty="0">
@@ -7439,7 +6971,7 @@
                   <a:srgbClr val="7A788D"/>
                 </a:solidFill>
               </a:rPr>
-              <a:t>Coverage </a:t>
+              <a:t>Test Coverage </a:t>
             </a:r>
             <a:r>
               <a:rPr lang="ko-KR" altLang="en-US" sz="2000" b="1" dirty="0">
@@ -7462,130 +6994,6 @@
   <p:clrMapOvr>
     <a:masterClrMapping/>
   </p:clrMapOvr>
-  <p:timing>
-    <p:tnLst>
-      <p:par>
-        <p:cTn id="1" dur="indefinite" restart="never" nodeType="tmRoot">
-          <p:childTnLst>
-            <p:seq concurrent="1" nextAc="seek">
-              <p:cTn id="2" dur="indefinite" nodeType="mainSeq">
-                <p:childTnLst>
-                  <p:par>
-                    <p:cTn id="3" fill="hold">
-                      <p:stCondLst>
-                        <p:cond delay="indefinite"/>
-                      </p:stCondLst>
-                      <p:childTnLst>
-                        <p:par>
-                          <p:cTn id="4" fill="hold">
-                            <p:stCondLst>
-                              <p:cond delay="0"/>
-                            </p:stCondLst>
-                            <p:childTnLst>
-                              <p:par>
-                                <p:cTn id="5" presetID="1" presetClass="entr" presetSubtype="0" fill="hold" grpId="0" nodeType="clickEffect">
-                                  <p:stCondLst>
-                                    <p:cond delay="0"/>
-                                  </p:stCondLst>
-                                  <p:childTnLst>
-                                    <p:set>
-                                      <p:cBhvr>
-                                        <p:cTn id="6" dur="1" fill="hold">
-                                          <p:stCondLst>
-                                            <p:cond delay="0"/>
-                                          </p:stCondLst>
-                                        </p:cTn>
-                                        <p:tgtEl>
-                                          <p:spTgt spid="8"/>
-                                        </p:tgtEl>
-                                        <p:attrNameLst>
-                                          <p:attrName>style.visibility</p:attrName>
-                                        </p:attrNameLst>
-                                      </p:cBhvr>
-                                      <p:to>
-                                        <p:strVal val="visible"/>
-                                      </p:to>
-                                    </p:set>
-                                  </p:childTnLst>
-                                </p:cTn>
-                              </p:par>
-                            </p:childTnLst>
-                          </p:cTn>
-                        </p:par>
-                      </p:childTnLst>
-                    </p:cTn>
-                  </p:par>
-                  <p:par>
-                    <p:cTn id="7" fill="hold">
-                      <p:stCondLst>
-                        <p:cond delay="indefinite"/>
-                      </p:stCondLst>
-                      <p:childTnLst>
-                        <p:par>
-                          <p:cTn id="8" fill="hold">
-                            <p:stCondLst>
-                              <p:cond delay="0"/>
-                            </p:stCondLst>
-                            <p:childTnLst>
-                              <p:par>
-                                <p:cTn id="9" presetID="1" presetClass="entr" presetSubtype="0" fill="hold" grpId="0" nodeType="clickEffect">
-                                  <p:stCondLst>
-                                    <p:cond delay="0"/>
-                                  </p:stCondLst>
-                                  <p:childTnLst>
-                                    <p:set>
-                                      <p:cBhvr>
-                                        <p:cTn id="10" dur="1" fill="hold">
-                                          <p:stCondLst>
-                                            <p:cond delay="0"/>
-                                          </p:stCondLst>
-                                        </p:cTn>
-                                        <p:tgtEl>
-                                          <p:spTgt spid="9"/>
-                                        </p:tgtEl>
-                                        <p:attrNameLst>
-                                          <p:attrName>style.visibility</p:attrName>
-                                        </p:attrNameLst>
-                                      </p:cBhvr>
-                                      <p:to>
-                                        <p:strVal val="visible"/>
-                                      </p:to>
-                                    </p:set>
-                                  </p:childTnLst>
-                                </p:cTn>
-                              </p:par>
-                            </p:childTnLst>
-                          </p:cTn>
-                        </p:par>
-                      </p:childTnLst>
-                    </p:cTn>
-                  </p:par>
-                </p:childTnLst>
-              </p:cTn>
-              <p:prevCondLst>
-                <p:cond evt="onPrev" delay="0">
-                  <p:tgtEl>
-                    <p:sldTgt/>
-                  </p:tgtEl>
-                </p:cond>
-              </p:prevCondLst>
-              <p:nextCondLst>
-                <p:cond evt="onNext" delay="0">
-                  <p:tgtEl>
-                    <p:sldTgt/>
-                  </p:tgtEl>
-                </p:cond>
-              </p:nextCondLst>
-            </p:seq>
-          </p:childTnLst>
-        </p:cTn>
-      </p:par>
-    </p:tnLst>
-    <p:bldLst>
-      <p:bldP spid="8" grpId="0" animBg="1"/>
-      <p:bldP spid="9" grpId="0" animBg="1"/>
-    </p:bldLst>
-  </p:timing>
 </p:sld>
 </file>
 
@@ -7776,8 +7184,8 @@
         </p:nvSpPr>
         <p:spPr>
           <a:xfrm>
-            <a:off x="3506252" y="1580108"/>
-            <a:ext cx="5179495" cy="646331"/>
+            <a:off x="3399650" y="1565941"/>
+            <a:ext cx="5392695" cy="646331"/>
           </a:xfrm>
           <a:prstGeom prst="rect">
             <a:avLst/>
@@ -7796,7 +7204,7 @@
                   <a:srgbClr val="7A788D"/>
                 </a:solidFill>
               </a:rPr>
-              <a:t>Bug 0, Coverage 100%</a:t>
+              <a:t>Bugs 0, Coverage 100%</a:t>
             </a:r>
             <a:endParaRPr lang="ko-KR" altLang="en-US" sz="3600" b="1" dirty="0">
               <a:solidFill>
@@ -7821,7 +7229,7 @@
         <p:spPr>
           <a:xfrm>
             <a:off x="1492624" y="2921168"/>
-            <a:ext cx="3670044" cy="1015663"/>
+            <a:ext cx="4213910" cy="1015663"/>
           </a:xfrm>
           <a:prstGeom prst="rect">
             <a:avLst/>
@@ -7890,7 +7298,7 @@
                   <a:srgbClr val="7A788D"/>
                 </a:solidFill>
               </a:rPr>
-              <a:t>Coverage 100% </a:t>
+              <a:t>Test Coverage 100% </a:t>
             </a:r>
             <a:r>
               <a:rPr lang="ko-KR" altLang="en-US" sz="2000" b="1" dirty="0">
@@ -8078,176 +7486,6 @@
   <p:clrMapOvr>
     <a:masterClrMapping/>
   </p:clrMapOvr>
-  <p:timing>
-    <p:tnLst>
-      <p:par>
-        <p:cTn id="1" dur="indefinite" restart="never" nodeType="tmRoot">
-          <p:childTnLst>
-            <p:seq concurrent="1" nextAc="seek">
-              <p:cTn id="2" dur="indefinite" nodeType="mainSeq">
-                <p:childTnLst>
-                  <p:par>
-                    <p:cTn id="3" fill="hold">
-                      <p:stCondLst>
-                        <p:cond delay="indefinite"/>
-                      </p:stCondLst>
-                      <p:childTnLst>
-                        <p:par>
-                          <p:cTn id="4" fill="hold">
-                            <p:stCondLst>
-                              <p:cond delay="0"/>
-                            </p:stCondLst>
-                            <p:childTnLst>
-                              <p:par>
-                                <p:cTn id="5" presetID="1" presetClass="entr" presetSubtype="0" fill="hold" grpId="0" nodeType="clickEffect">
-                                  <p:stCondLst>
-                                    <p:cond delay="0"/>
-                                  </p:stCondLst>
-                                  <p:childTnLst>
-                                    <p:set>
-                                      <p:cBhvr>
-                                        <p:cTn id="6" dur="1" fill="hold">
-                                          <p:stCondLst>
-                                            <p:cond delay="0"/>
-                                          </p:stCondLst>
-                                        </p:cTn>
-                                        <p:tgtEl>
-                                          <p:spTgt spid="7"/>
-                                        </p:tgtEl>
-                                        <p:attrNameLst>
-                                          <p:attrName>style.visibility</p:attrName>
-                                        </p:attrNameLst>
-                                      </p:cBhvr>
-                                      <p:to>
-                                        <p:strVal val="visible"/>
-                                      </p:to>
-                                    </p:set>
-                                  </p:childTnLst>
-                                </p:cTn>
-                              </p:par>
-                            </p:childTnLst>
-                          </p:cTn>
-                        </p:par>
-                      </p:childTnLst>
-                    </p:cTn>
-                  </p:par>
-                  <p:par>
-                    <p:cTn id="7" fill="hold">
-                      <p:stCondLst>
-                        <p:cond delay="indefinite"/>
-                      </p:stCondLst>
-                      <p:childTnLst>
-                        <p:par>
-                          <p:cTn id="8" fill="hold">
-                            <p:stCondLst>
-                              <p:cond delay="0"/>
-                            </p:stCondLst>
-                            <p:childTnLst>
-                              <p:par>
-                                <p:cTn id="9" presetID="1" presetClass="entr" presetSubtype="0" fill="hold" grpId="0" nodeType="clickEffect">
-                                  <p:stCondLst>
-                                    <p:cond delay="0"/>
-                                  </p:stCondLst>
-                                  <p:childTnLst>
-                                    <p:set>
-                                      <p:cBhvr>
-                                        <p:cTn id="10" dur="1" fill="hold">
-                                          <p:stCondLst>
-                                            <p:cond delay="0"/>
-                                          </p:stCondLst>
-                                        </p:cTn>
-                                        <p:tgtEl>
-                                          <p:spTgt spid="9"/>
-                                        </p:tgtEl>
-                                        <p:attrNameLst>
-                                          <p:attrName>style.visibility</p:attrName>
-                                        </p:attrNameLst>
-                                      </p:cBhvr>
-                                      <p:to>
-                                        <p:strVal val="visible"/>
-                                      </p:to>
-                                    </p:set>
-                                  </p:childTnLst>
-                                </p:cTn>
-                              </p:par>
-                            </p:childTnLst>
-                          </p:cTn>
-                        </p:par>
-                      </p:childTnLst>
-                    </p:cTn>
-                  </p:par>
-                  <p:par>
-                    <p:cTn id="11" fill="hold">
-                      <p:stCondLst>
-                        <p:cond delay="indefinite"/>
-                      </p:stCondLst>
-                      <p:childTnLst>
-                        <p:par>
-                          <p:cTn id="12" fill="hold">
-                            <p:stCondLst>
-                              <p:cond delay="0"/>
-                            </p:stCondLst>
-                            <p:childTnLst>
-                              <p:par>
-                                <p:cTn id="13" presetID="1" presetClass="entr" presetSubtype="0" fill="hold" grpId="0" nodeType="clickEffect">
-                                  <p:stCondLst>
-                                    <p:cond delay="0"/>
-                                  </p:stCondLst>
-                                  <p:childTnLst>
-                                    <p:set>
-                                      <p:cBhvr>
-                                        <p:cTn id="14" dur="1" fill="hold">
-                                          <p:stCondLst>
-                                            <p:cond delay="0"/>
-                                          </p:stCondLst>
-                                        </p:cTn>
-                                        <p:tgtEl>
-                                          <p:spTgt spid="10"/>
-                                        </p:tgtEl>
-                                        <p:attrNameLst>
-                                          <p:attrName>style.visibility</p:attrName>
-                                        </p:attrNameLst>
-                                      </p:cBhvr>
-                                      <p:to>
-                                        <p:strVal val="visible"/>
-                                      </p:to>
-                                    </p:set>
-                                  </p:childTnLst>
-                                </p:cTn>
-                              </p:par>
-                            </p:childTnLst>
-                          </p:cTn>
-                        </p:par>
-                      </p:childTnLst>
-                    </p:cTn>
-                  </p:par>
-                </p:childTnLst>
-              </p:cTn>
-              <p:prevCondLst>
-                <p:cond evt="onPrev" delay="0">
-                  <p:tgtEl>
-                    <p:sldTgt/>
-                  </p:tgtEl>
-                </p:cond>
-              </p:prevCondLst>
-              <p:nextCondLst>
-                <p:cond evt="onNext" delay="0">
-                  <p:tgtEl>
-                    <p:sldTgt/>
-                  </p:tgtEl>
-                </p:cond>
-              </p:nextCondLst>
-            </p:seq>
-          </p:childTnLst>
-        </p:cTn>
-      </p:par>
-    </p:tnLst>
-    <p:bldLst>
-      <p:bldP spid="7" grpId="0" animBg="1"/>
-      <p:bldP spid="9" grpId="0" animBg="1"/>
-      <p:bldP spid="10" grpId="0" animBg="1"/>
-    </p:bldLst>
-  </p:timing>
 </p:sld>
 </file>
 
@@ -10830,8 +10068,8 @@
         </p:nvSpPr>
         <p:spPr>
           <a:xfrm>
-            <a:off x="2629480" y="1601550"/>
-            <a:ext cx="6933053" cy="584775"/>
+            <a:off x="2636245" y="1601550"/>
+            <a:ext cx="6919523" cy="584775"/>
           </a:xfrm>
           <a:prstGeom prst="rect">
             <a:avLst/>
@@ -10940,7 +10178,7 @@
           <a:p>
             <a:pPr algn="ctr"/>
             <a:r>
-              <a:rPr lang="en-US" altLang="ko-KR" sz="3200" spc="-150" dirty="0">
+              <a:rPr lang="en-US" altLang="ko-KR" sz="3200" b="1" spc="-150" dirty="0">
                 <a:solidFill>
                   <a:srgbClr val="7A788D"/>
                 </a:solidFill>
@@ -10949,7 +10187,7 @@
               </a:rPr>
               <a:t>Throwaway(rapid) Prototyping Model</a:t>
             </a:r>
-            <a:endParaRPr lang="ko-KR" altLang="en-US" sz="3200" spc="-150" dirty="0">
+            <a:endParaRPr lang="ko-KR" altLang="en-US" sz="3200" b="1" spc="-150" dirty="0">
               <a:solidFill>
                 <a:srgbClr val="7A788D"/>
               </a:solidFill>

</xml_diff>